<commit_message>
Fixed label error. Added new schemes for my account for notifications. Changed image size so that the item title appears on the screen too.
Former-commit-id: 05d5f81b4e58b619049e67f2931e519024a14d3a
</commit_message>
<xml_diff>
--- a/presentation/Presentation1.pptx
+++ b/presentation/Presentation1.pptx
@@ -8,6 +8,7 @@
     <p:sldId id="256" r:id="rId2"/>
     <p:sldId id="258" r:id="rId3"/>
     <p:sldId id="257" r:id="rId4"/>
+    <p:sldId id="259" r:id="rId5"/>
   </p:sldIdLst>
   <p:sldSz cx="12192000" cy="6858000"/>
   <p:notesSz cx="6858000" cy="9144000"/>
@@ -240,7 +241,7 @@
           <a:p>
             <a:fld id="{E91237FF-7400-0548-B678-D169CF900D2E}" type="datetimeFigureOut">
               <a:rPr lang="en-US" smtClean="0"/>
-              <a:t>5/21/15</a:t>
+              <a:t>5/22/15</a:t>
             </a:fld>
             <a:endParaRPr lang="en-US"/>
           </a:p>
@@ -410,7 +411,7 @@
           <a:p>
             <a:fld id="{E91237FF-7400-0548-B678-D169CF900D2E}" type="datetimeFigureOut">
               <a:rPr lang="en-US" smtClean="0"/>
-              <a:t>5/21/15</a:t>
+              <a:t>5/22/15</a:t>
             </a:fld>
             <a:endParaRPr lang="en-US"/>
           </a:p>
@@ -590,7 +591,7 @@
           <a:p>
             <a:fld id="{E91237FF-7400-0548-B678-D169CF900D2E}" type="datetimeFigureOut">
               <a:rPr lang="en-US" smtClean="0"/>
-              <a:t>5/21/15</a:t>
+              <a:t>5/22/15</a:t>
             </a:fld>
             <a:endParaRPr lang="en-US"/>
           </a:p>
@@ -760,7 +761,7 @@
           <a:p>
             <a:fld id="{E91237FF-7400-0548-B678-D169CF900D2E}" type="datetimeFigureOut">
               <a:rPr lang="en-US" smtClean="0"/>
-              <a:t>5/21/15</a:t>
+              <a:t>5/22/15</a:t>
             </a:fld>
             <a:endParaRPr lang="en-US"/>
           </a:p>
@@ -1006,7 +1007,7 @@
           <a:p>
             <a:fld id="{E91237FF-7400-0548-B678-D169CF900D2E}" type="datetimeFigureOut">
               <a:rPr lang="en-US" smtClean="0"/>
-              <a:t>5/21/15</a:t>
+              <a:t>5/22/15</a:t>
             </a:fld>
             <a:endParaRPr lang="en-US"/>
           </a:p>
@@ -1238,7 +1239,7 @@
           <a:p>
             <a:fld id="{E91237FF-7400-0548-B678-D169CF900D2E}" type="datetimeFigureOut">
               <a:rPr lang="en-US" smtClean="0"/>
-              <a:t>5/21/15</a:t>
+              <a:t>5/22/15</a:t>
             </a:fld>
             <a:endParaRPr lang="en-US"/>
           </a:p>
@@ -1605,7 +1606,7 @@
           <a:p>
             <a:fld id="{E91237FF-7400-0548-B678-D169CF900D2E}" type="datetimeFigureOut">
               <a:rPr lang="en-US" smtClean="0"/>
-              <a:t>5/21/15</a:t>
+              <a:t>5/22/15</a:t>
             </a:fld>
             <a:endParaRPr lang="en-US"/>
           </a:p>
@@ -1723,7 +1724,7 @@
           <a:p>
             <a:fld id="{E91237FF-7400-0548-B678-D169CF900D2E}" type="datetimeFigureOut">
               <a:rPr lang="en-US" smtClean="0"/>
-              <a:t>5/21/15</a:t>
+              <a:t>5/22/15</a:t>
             </a:fld>
             <a:endParaRPr lang="en-US"/>
           </a:p>
@@ -1818,7 +1819,7 @@
           <a:p>
             <a:fld id="{E91237FF-7400-0548-B678-D169CF900D2E}" type="datetimeFigureOut">
               <a:rPr lang="en-US" smtClean="0"/>
-              <a:t>5/21/15</a:t>
+              <a:t>5/22/15</a:t>
             </a:fld>
             <a:endParaRPr lang="en-US"/>
           </a:p>
@@ -2095,7 +2096,7 @@
           <a:p>
             <a:fld id="{E91237FF-7400-0548-B678-D169CF900D2E}" type="datetimeFigureOut">
               <a:rPr lang="en-US" smtClean="0"/>
-              <a:t>5/21/15</a:t>
+              <a:t>5/22/15</a:t>
             </a:fld>
             <a:endParaRPr lang="en-US"/>
           </a:p>
@@ -2348,7 +2349,7 @@
           <a:p>
             <a:fld id="{E91237FF-7400-0548-B678-D169CF900D2E}" type="datetimeFigureOut">
               <a:rPr lang="en-US" smtClean="0"/>
-              <a:t>5/21/15</a:t>
+              <a:t>5/22/15</a:t>
             </a:fld>
             <a:endParaRPr lang="en-US"/>
           </a:p>
@@ -2563,7 +2564,7 @@
             <a:fld id="{E91237FF-7400-0548-B678-D169CF900D2E}" type="datetimeFigureOut">
               <a:rPr lang="en-US" smtClean="0"/>
               <a:pPr/>
-              <a:t>5/21/15</a:t>
+              <a:t>5/22/15</a:t>
             </a:fld>
             <a:endParaRPr lang="en-US" dirty="0"/>
           </a:p>
@@ -3188,48 +3189,19 @@
           <a:p>
             <a:r>
               <a:rPr lang="en-US" sz="2400" dirty="0" smtClean="0"/>
-              <a:t>Application</a:t>
-            </a:r>
+              <a:t>Application: View feed</a:t>
+            </a:r>
+          </a:p>
+          <a:p>
+            <a:endParaRPr lang="en-US" sz="2400" dirty="0" smtClean="0"/>
+          </a:p>
+          <a:p>
+            <a:pPr marL="0" indent="0">
+              <a:buNone/>
+            </a:pPr>
             <a:r>
               <a:rPr lang="en-US" sz="2400" dirty="0" smtClean="0"/>
-              <a:t>: View feed</a:t>
-            </a:r>
-            <a:endParaRPr lang="en-US" sz="2400" dirty="0" smtClean="0"/>
-          </a:p>
-          <a:p>
-            <a:endParaRPr lang="en-US" sz="2400" dirty="0" smtClean="0"/>
-          </a:p>
-          <a:p>
-            <a:pPr marL="0" indent="0">
-              <a:buNone/>
-            </a:pPr>
-            <a:r>
-              <a:rPr lang="en-US" sz="2400" dirty="0" smtClean="0"/>
-              <a:t>Bakkle icon </a:t>
-            </a:r>
-            <a:r>
-              <a:rPr lang="en-US" sz="2400" dirty="0" smtClean="0"/>
-              <a:t>on home </a:t>
-            </a:r>
-            <a:r>
-              <a:rPr lang="en-US" sz="2400" dirty="0" smtClean="0"/>
-              <a:t>screen </a:t>
-            </a:r>
-            <a:r>
-              <a:rPr lang="en-US" sz="2400" dirty="0" smtClean="0"/>
-              <a:t>launches </a:t>
-            </a:r>
-            <a:r>
-              <a:rPr lang="en-US" sz="2400" dirty="0" smtClean="0"/>
-              <a:t>the app. Notifications </a:t>
-            </a:r>
-            <a:r>
-              <a:rPr lang="en-US" sz="2400" dirty="0" smtClean="0"/>
-              <a:t>are displayed when </a:t>
-            </a:r>
-            <a:r>
-              <a:rPr lang="en-US" sz="2400" dirty="0" smtClean="0"/>
-              <a:t>received.</a:t>
+              <a:t>Bakkle icon on home screen launches the app. Notifications are displayed when received.</a:t>
             </a:r>
             <a:endParaRPr lang="en-US" sz="2400" dirty="0"/>
           </a:p>
@@ -3540,6 +3512,199 @@
     <p:extLst>
       <p:ext uri="{BB962C8B-B14F-4D97-AF65-F5344CB8AC3E}">
         <p14:creationId xmlns:p14="http://schemas.microsoft.com/office/powerpoint/2010/main" val="424238335"/>
+      </p:ext>
+    </p:extLst>
+  </p:cSld>
+  <p:clrMapOvr>
+    <a:masterClrMapping/>
+  </p:clrMapOvr>
+</p:sld>
+</file>
+
+<file path=ppt/slides/slide4.xml><?xml version="1.0" encoding="utf-8"?>
+<p:sld xmlns:a="http://schemas.openxmlformats.org/drawingml/2006/main" xmlns:r="http://schemas.openxmlformats.org/officeDocument/2006/relationships" xmlns:p="http://schemas.openxmlformats.org/presentationml/2006/main">
+  <p:cSld>
+    <p:spTree>
+      <p:nvGrpSpPr>
+        <p:cNvPr id="1" name=""/>
+        <p:cNvGrpSpPr/>
+        <p:nvPr/>
+      </p:nvGrpSpPr>
+      <p:grpSpPr>
+        <a:xfrm>
+          <a:off x="0" y="0"/>
+          <a:ext cx="0" cy="0"/>
+          <a:chOff x="0" y="0"/>
+          <a:chExt cx="0" cy="0"/>
+        </a:xfrm>
+      </p:grpSpPr>
+      <p:sp>
+        <p:nvSpPr>
+          <p:cNvPr id="7" name="Rectangle 6"/>
+          <p:cNvSpPr/>
+          <p:nvPr/>
+        </p:nvSpPr>
+        <p:spPr>
+          <a:xfrm>
+            <a:off x="7349699" y="70005"/>
+            <a:ext cx="4004101" cy="4440324"/>
+          </a:xfrm>
+          <a:prstGeom prst="rect">
+            <a:avLst/>
+          </a:prstGeom>
+        </p:spPr>
+        <p:style>
+          <a:lnRef idx="1">
+            <a:schemeClr val="accent1"/>
+          </a:lnRef>
+          <a:fillRef idx="3">
+            <a:schemeClr val="accent1"/>
+          </a:fillRef>
+          <a:effectRef idx="2">
+            <a:schemeClr val="accent1"/>
+          </a:effectRef>
+          <a:fontRef idx="minor">
+            <a:schemeClr val="lt1"/>
+          </a:fontRef>
+        </p:style>
+        <p:txBody>
+          <a:bodyPr rtlCol="0" anchor="ctr"/>
+          <a:lstStyle/>
+          <a:p>
+            <a:pPr algn="ctr"/>
+            <a:endParaRPr lang="en-US"/>
+          </a:p>
+        </p:txBody>
+      </p:sp>
+      <p:sp>
+        <p:nvSpPr>
+          <p:cNvPr id="2" name="Title 1"/>
+          <p:cNvSpPr>
+            <a:spLocks noGrp="1"/>
+          </p:cNvSpPr>
+          <p:nvPr>
+            <p:ph type="title"/>
+          </p:nvPr>
+        </p:nvSpPr>
+        <p:spPr/>
+        <p:txBody>
+          <a:bodyPr/>
+          <a:lstStyle/>
+          <a:p>
+            <a:r>
+              <a:rPr lang="en-US" dirty="0" smtClean="0"/>
+              <a:t>Feed</a:t>
+            </a:r>
+            <a:endParaRPr lang="en-US" dirty="0"/>
+          </a:p>
+        </p:txBody>
+      </p:sp>
+      <p:sp>
+        <p:nvSpPr>
+          <p:cNvPr id="3" name="Content Placeholder 2"/>
+          <p:cNvSpPr>
+            <a:spLocks noGrp="1"/>
+          </p:cNvSpPr>
+          <p:nvPr>
+            <p:ph idx="1"/>
+          </p:nvPr>
+        </p:nvSpPr>
+        <p:spPr>
+          <a:xfrm>
+            <a:off x="838200" y="1825624"/>
+            <a:ext cx="10515600" cy="3384755"/>
+          </a:xfrm>
+        </p:spPr>
+        <p:txBody>
+          <a:bodyPr/>
+          <a:lstStyle/>
+          <a:p>
+            <a:pPr>
+              <a:buFontTx/>
+              <a:buChar char="-"/>
+            </a:pPr>
+            <a:r>
+              <a:rPr lang="en-US" dirty="0" smtClean="0"/>
+              <a:t>Mimics Phone Feed</a:t>
+            </a:r>
+          </a:p>
+          <a:p>
+            <a:pPr>
+              <a:buFontTx/>
+              <a:buChar char="-"/>
+            </a:pPr>
+            <a:r>
+              <a:rPr lang="en-US" dirty="0" smtClean="0"/>
+              <a:t>See next item in feed</a:t>
+            </a:r>
+          </a:p>
+          <a:p>
+            <a:pPr>
+              <a:buFontTx/>
+              <a:buChar char="-"/>
+            </a:pPr>
+            <a:r>
+              <a:rPr lang="en-US" dirty="0" smtClean="0"/>
+              <a:t>Want and Meh</a:t>
+            </a:r>
+          </a:p>
+          <a:p>
+            <a:pPr>
+              <a:buFontTx/>
+              <a:buChar char="-"/>
+            </a:pPr>
+            <a:r>
+              <a:rPr lang="en-US" dirty="0" smtClean="0"/>
+              <a:t>No Swiping</a:t>
+            </a:r>
+          </a:p>
+          <a:p>
+            <a:pPr>
+              <a:buFontTx/>
+              <a:buChar char="-"/>
+            </a:pPr>
+            <a:r>
+              <a:rPr lang="en-US" dirty="0" smtClean="0"/>
+              <a:t>Requires scrolling</a:t>
+            </a:r>
+            <a:endParaRPr lang="en-US" dirty="0"/>
+          </a:p>
+        </p:txBody>
+      </p:sp>
+      <p:pic>
+        <p:nvPicPr>
+          <p:cNvPr id="5" name="Picture 4" descr="screen.png"/>
+          <p:cNvPicPr>
+            <a:picLocks noChangeAspect="1"/>
+          </p:cNvPicPr>
+          <p:nvPr/>
+        </p:nvPicPr>
+        <p:blipFill>
+          <a:blip r:embed="rId2">
+            <a:extLst>
+              <a:ext uri="{28A0092B-C50C-407E-A947-70E740481C1C}">
+                <a14:useLocalDpi xmlns:a14="http://schemas.microsoft.com/office/drawing/2010/main" val="0"/>
+              </a:ext>
+            </a:extLst>
+          </a:blip>
+          <a:stretch>
+            <a:fillRect/>
+          </a:stretch>
+        </p:blipFill>
+        <p:spPr>
+          <a:xfrm>
+            <a:off x="7602417" y="216076"/>
+            <a:ext cx="3454400" cy="6311900"/>
+          </a:xfrm>
+          <a:prstGeom prst="rect">
+            <a:avLst/>
+          </a:prstGeom>
+        </p:spPr>
+      </p:pic>
+    </p:spTree>
+    <p:extLst>
+      <p:ext uri="{BB962C8B-B14F-4D97-AF65-F5344CB8AC3E}">
+        <p14:creationId xmlns:p14="http://schemas.microsoft.com/office/powerpoint/2010/main" val="3805516129"/>
       </p:ext>
     </p:extLst>
   </p:cSld>
@@ -3804,7 +3969,7 @@
   <a:extraClrSchemeLst/>
   <a:extLst>
     <a:ext uri="{05A4C25C-085E-4340-85A3-A5531E510DB2}">
-      <thm15:themeFamily xmlns:thm15="http://schemas.microsoft.com/office/thememl/2012/main" xmlns="" name="Office Theme" id="{62F939B6-93AF-4DB8-9C6B-D6C7DFDC589F}" vid="{4A3C46E8-61CC-4603-A589-7422A47A8E4A}"/>
+      <thm15:themeFamily xmlns="" xmlns:thm15="http://schemas.microsoft.com/office/thememl/2012/main" name="Office Theme" id="{62F939B6-93AF-4DB8-9C6B-D6C7DFDC589F}" vid="{4A3C46E8-61CC-4603-A589-7422A47A8E4A}"/>
     </a:ext>
   </a:extLst>
 </a:theme>

</xml_diff>